<commit_message>
feat: add template generator script
</commit_message>
<xml_diff>
--- a/template/nametag.pptx
+++ b/template/nametag.pptx
@@ -224,7 +224,7 @@
           <a:p>
             <a:fld id="{8EC2616C-06E9-49BB-A519-209A8D4F15AE}" type="datetimeFigureOut">
               <a:rPr lang="ko-KR" altLang="en-US" smtClean="0"/>
-              <a:t>2024-02-11</a:t>
+              <a:t>2024-11-22</a:t>
             </a:fld>
             <a:endParaRPr lang="ko-KR" altLang="en-US"/>
           </a:p>
@@ -747,7 +747,7 @@
           <a:p>
             <a:fld id="{17A1B1BA-F0E4-4197-9299-0B2B9E3620EE}" type="datetimeFigureOut">
               <a:rPr lang="ko-KR" altLang="en-US" smtClean="0"/>
-              <a:t>2024-02-11</a:t>
+              <a:t>2024-11-22</a:t>
             </a:fld>
             <a:endParaRPr lang="ko-KR" altLang="en-US"/>
           </a:p>

</xml_diff>